<commit_message>
add module_02 and module_03
</commit_message>
<xml_diff>
--- a/module_01/pres.pptx
+++ b/module_01/pres.pptx
@@ -925,8 +925,8 @@
   </pc:docChgLst>
   <pc:docChgLst>
     <pc:chgData name="Мария Савинова" userId="e24eaf7e9b1ed84c" providerId="LiveId" clId="{CA7C8432-EF19-6242-B377-84BFA69192C1}"/>
-    <pc:docChg chg="modSld">
-      <pc:chgData name="Мария Савинова" userId="e24eaf7e9b1ed84c" providerId="LiveId" clId="{CA7C8432-EF19-6242-B377-84BFA69192C1}" dt="2024-09-20T17:40:05.350" v="134" actId="113"/>
+    <pc:docChg chg="undo custSel modSld">
+      <pc:chgData name="Мария Савинова" userId="e24eaf7e9b1ed84c" providerId="LiveId" clId="{CA7C8432-EF19-6242-B377-84BFA69192C1}" dt="2024-09-25T07:02:04.017" v="175" actId="122"/>
       <pc:docMkLst>
         <pc:docMk/>
       </pc:docMkLst>
@@ -950,6 +950,52 @@
             <pc:docMk/>
             <pc:sldMk cId="4014811966" sldId="257"/>
             <ac:spMk id="3" creationId="{00000000-0000-0000-0000-000000000000}"/>
+          </ac:spMkLst>
+        </pc:spChg>
+      </pc:sldChg>
+      <pc:sldChg chg="modSp">
+        <pc:chgData name="Мария Савинова" userId="e24eaf7e9b1ed84c" providerId="LiveId" clId="{CA7C8432-EF19-6242-B377-84BFA69192C1}" dt="2024-09-25T06:57:07.571" v="145" actId="113"/>
+        <pc:sldMkLst>
+          <pc:docMk/>
+          <pc:sldMk cId="36148254" sldId="264"/>
+        </pc:sldMkLst>
+        <pc:spChg chg="mod">
+          <ac:chgData name="Мария Савинова" userId="e24eaf7e9b1ed84c" providerId="LiveId" clId="{CA7C8432-EF19-6242-B377-84BFA69192C1}" dt="2024-09-25T06:57:07.571" v="145" actId="113"/>
+          <ac:spMkLst>
+            <pc:docMk/>
+            <pc:sldMk cId="36148254" sldId="264"/>
+            <ac:spMk id="3" creationId="{00000000-0000-0000-0000-000000000000}"/>
+          </ac:spMkLst>
+        </pc:spChg>
+      </pc:sldChg>
+      <pc:sldChg chg="modSp">
+        <pc:chgData name="Мария Савинова" userId="e24eaf7e9b1ed84c" providerId="LiveId" clId="{CA7C8432-EF19-6242-B377-84BFA69192C1}" dt="2024-09-25T07:02:04.017" v="175" actId="122"/>
+        <pc:sldMkLst>
+          <pc:docMk/>
+          <pc:sldMk cId="2214237742" sldId="272"/>
+        </pc:sldMkLst>
+        <pc:spChg chg="mod">
+          <ac:chgData name="Мария Савинова" userId="e24eaf7e9b1ed84c" providerId="LiveId" clId="{CA7C8432-EF19-6242-B377-84BFA69192C1}" dt="2024-09-25T07:02:04.017" v="175" actId="122"/>
+          <ac:spMkLst>
+            <pc:docMk/>
+            <pc:sldMk cId="2214237742" sldId="272"/>
+            <ac:spMk id="3" creationId="{00000000-0000-0000-0000-000000000000}"/>
+          </ac:spMkLst>
+        </pc:spChg>
+        <pc:spChg chg="mod">
+          <ac:chgData name="Мария Савинова" userId="e24eaf7e9b1ed84c" providerId="LiveId" clId="{CA7C8432-EF19-6242-B377-84BFA69192C1}" dt="2024-09-25T07:01:45.264" v="161" actId="1076"/>
+          <ac:spMkLst>
+            <pc:docMk/>
+            <pc:sldMk cId="2214237742" sldId="272"/>
+            <ac:spMk id="8" creationId="{426C69A6-A2F1-40A8-B889-C63B1AE0A2E3}"/>
+          </ac:spMkLst>
+        </pc:spChg>
+        <pc:spChg chg="mod">
+          <ac:chgData name="Мария Савинова" userId="e24eaf7e9b1ed84c" providerId="LiveId" clId="{CA7C8432-EF19-6242-B377-84BFA69192C1}" dt="2024-09-25T07:01:54.799" v="165" actId="1076"/>
+          <ac:spMkLst>
+            <pc:docMk/>
+            <pc:sldMk cId="2214237742" sldId="272"/>
+            <ac:spMk id="10" creationId="{CA34E12E-4C3B-42AE-966D-48234B6733F0}"/>
           </ac:spMkLst>
         </pc:spChg>
       </pc:sldChg>
@@ -1045,7 +1091,7 @@
             <a:fld id="{C65AC966-90DC-47D7-B999-4B8AD4DFB48E}" type="datetimeFigureOut">
               <a:rPr lang="ru-RU" smtClean="0"/>
               <a:pPr/>
-              <a:t>23.09.2024</a:t>
+              <a:t>25.09.2024</a:t>
             </a:fld>
             <a:endParaRPr lang="ru-RU" dirty="0"/>
           </a:p>
@@ -2874,7 +2920,7 @@
           <a:p>
             <a:fld id="{ECC89CEC-ADFD-4489-90FF-547616DBC041}" type="datetime1">
               <a:rPr lang="ru-RU" smtClean="0"/>
-              <a:t>23.09.2024</a:t>
+              <a:t>25.09.2024</a:t>
             </a:fld>
             <a:endParaRPr lang="ru-RU"/>
           </a:p>
@@ -3045,7 +3091,7 @@
           <a:p>
             <a:fld id="{86B7BB86-73CF-40D4-8C7F-CA234FF7A1EB}" type="datetime1">
               <a:rPr lang="ru-RU" smtClean="0"/>
-              <a:t>23.09.2024</a:t>
+              <a:t>25.09.2024</a:t>
             </a:fld>
             <a:endParaRPr lang="ru-RU"/>
           </a:p>
@@ -3226,7 +3272,7 @@
           <a:p>
             <a:fld id="{36B73C63-5989-47F0-8A38-867659112843}" type="datetime1">
               <a:rPr lang="ru-RU" smtClean="0"/>
-              <a:t>23.09.2024</a:t>
+              <a:t>25.09.2024</a:t>
             </a:fld>
             <a:endParaRPr lang="ru-RU"/>
           </a:p>
@@ -3397,7 +3443,7 @@
           <a:p>
             <a:fld id="{3BF531FB-401D-4CE6-8E3E-F90EF76016F4}" type="datetime1">
               <a:rPr lang="ru-RU" smtClean="0"/>
-              <a:t>23.09.2024</a:t>
+              <a:t>25.09.2024</a:t>
             </a:fld>
             <a:endParaRPr lang="ru-RU"/>
           </a:p>
@@ -3645,7 +3691,7 @@
           <a:p>
             <a:fld id="{90C6E959-BFD7-4835-A209-4198B71FE91E}" type="datetime1">
               <a:rPr lang="ru-RU" smtClean="0"/>
-              <a:t>23.09.2024</a:t>
+              <a:t>25.09.2024</a:t>
             </a:fld>
             <a:endParaRPr lang="ru-RU"/>
           </a:p>
@@ -3877,7 +3923,7 @@
           <a:p>
             <a:fld id="{523FC2E9-7EB8-4737-8E9A-9590B7C8EA3D}" type="datetime1">
               <a:rPr lang="ru-RU" smtClean="0"/>
-              <a:t>23.09.2024</a:t>
+              <a:t>25.09.2024</a:t>
             </a:fld>
             <a:endParaRPr lang="ru-RU"/>
           </a:p>
@@ -4244,7 +4290,7 @@
           <a:p>
             <a:fld id="{AD9897CF-2BDA-410D-933A-6B9BAFD70E05}" type="datetime1">
               <a:rPr lang="ru-RU" smtClean="0"/>
-              <a:t>23.09.2024</a:t>
+              <a:t>25.09.2024</a:t>
             </a:fld>
             <a:endParaRPr lang="ru-RU"/>
           </a:p>
@@ -4364,7 +4410,7 @@
           <a:p>
             <a:fld id="{417622BC-58AC-4A2D-91CE-B90BE15D141D}" type="datetime1">
               <a:rPr lang="ru-RU" smtClean="0"/>
-              <a:t>23.09.2024</a:t>
+              <a:t>25.09.2024</a:t>
             </a:fld>
             <a:endParaRPr lang="ru-RU"/>
           </a:p>
@@ -4462,7 +4508,7 @@
           <a:p>
             <a:fld id="{2DD411C1-03FD-4174-8B29-1952A17761AD}" type="datetime1">
               <a:rPr lang="ru-RU" smtClean="0"/>
-              <a:t>23.09.2024</a:t>
+              <a:t>25.09.2024</a:t>
             </a:fld>
             <a:endParaRPr lang="ru-RU"/>
           </a:p>
@@ -4740,7 +4786,7 @@
           <a:p>
             <a:fld id="{8CD6FCDF-025A-4558-B7C0-9D70D2EBCE6F}" type="datetime1">
               <a:rPr lang="ru-RU" smtClean="0"/>
-              <a:t>23.09.2024</a:t>
+              <a:t>25.09.2024</a:t>
             </a:fld>
             <a:endParaRPr lang="ru-RU"/>
           </a:p>
@@ -4995,7 +5041,7 @@
           <a:p>
             <a:fld id="{4636EB14-F614-45DD-AF15-06D5CD69D646}" type="datetime1">
               <a:rPr lang="ru-RU" smtClean="0"/>
-              <a:t>23.09.2024</a:t>
+              <a:t>25.09.2024</a:t>
             </a:fld>
             <a:endParaRPr lang="ru-RU"/>
           </a:p>
@@ -5211,7 +5257,7 @@
             <a:fld id="{149376B8-C295-4A7D-87DF-C95CA526DB0A}" type="datetime1">
               <a:rPr lang="ru-RU" smtClean="0"/>
               <a:pPr/>
-              <a:t>23.09.2024</a:t>
+              <a:t>25.09.2024</a:t>
             </a:fld>
             <a:endParaRPr lang="ru-RU" dirty="0"/>
           </a:p>
@@ -6127,7 +6173,7 @@
         <p:spPr>
           <a:xfrm>
             <a:off x="838200" y="2179201"/>
-            <a:ext cx="4897582" cy="3575917"/>
+            <a:ext cx="4897582" cy="1472955"/>
           </a:xfrm>
         </p:spPr>
         <p:txBody>
@@ -6136,14 +6182,14 @@
           </a:bodyPr>
           <a:lstStyle/>
           <a:p>
-            <a:pPr marL="0" indent="0">
+            <a:pPr marL="0" indent="0" algn="ctr">
               <a:lnSpc>
-                <a:spcPct val="150000"/>
+                <a:spcPct val="100000"/>
               </a:lnSpc>
               <a:buNone/>
             </a:pPr>
             <a:r>
-              <a:rPr lang="ru-RU" sz="1500" b="1" dirty="0">
+              <a:rPr lang="ru-RU" sz="1800" b="1" dirty="0">
                 <a:solidFill>
                   <a:srgbClr val="326CDB"/>
                 </a:solidFill>
@@ -6153,14 +6199,14 @@
             </a:r>
           </a:p>
           <a:p>
-            <a:pPr marL="0" indent="0">
+            <a:pPr marL="0" indent="0" algn="ctr">
               <a:lnSpc>
-                <a:spcPct val="150000"/>
+                <a:spcPct val="100000"/>
               </a:lnSpc>
               <a:buNone/>
             </a:pPr>
             <a:r>
-              <a:rPr lang="ru-RU" sz="1500" dirty="0">
+              <a:rPr lang="ru-RU" sz="1800" dirty="0">
                 <a:solidFill>
                   <a:schemeClr val="bg1">
                     <a:lumMod val="50000"/>
@@ -6170,7 +6216,7 @@
               </a:rPr>
               <a:t>базовые лекарства, молоко, крупы, хлеб, соль, сахар</a:t>
             </a:r>
-            <a:endParaRPr lang="ru-RU" sz="1500" dirty="0">
+            <a:endParaRPr lang="ru-RU" sz="1800" dirty="0">
               <a:solidFill>
                 <a:schemeClr val="bg1">
                   <a:lumMod val="50000"/>
@@ -6292,7 +6338,7 @@
         <p:spPr>
           <a:xfrm>
             <a:off x="6096000" y="2179201"/>
-            <a:ext cx="4897582" cy="3575917"/>
+            <a:ext cx="4897582" cy="1472955"/>
           </a:xfrm>
           <a:prstGeom prst="rect">
             <a:avLst/>
@@ -6467,15 +6513,15 @@
             </a:lvl9pPr>
           </a:lstStyle>
           <a:p>
-            <a:pPr marL="0" indent="0">
+            <a:pPr marL="0" indent="0" algn="ctr">
               <a:lnSpc>
-                <a:spcPct val="150000"/>
+                <a:spcPct val="100000"/>
               </a:lnSpc>
               <a:buFont typeface="Arial" panose="020B0604020202020204" pitchFamily="34" charset="0"/>
               <a:buNone/>
             </a:pPr>
             <a:r>
-              <a:rPr lang="ru-RU" sz="1500" b="1" dirty="0">
+              <a:rPr lang="ru-RU" sz="1800" b="1" dirty="0">
                 <a:solidFill>
                   <a:srgbClr val="326CDB"/>
                 </a:solidFill>
@@ -6484,15 +6530,15 @@
             </a:r>
           </a:p>
           <a:p>
-            <a:pPr marL="0" indent="0">
+            <a:pPr marL="0" indent="0" algn="ctr">
               <a:lnSpc>
-                <a:spcPct val="150000"/>
+                <a:spcPct val="100000"/>
               </a:lnSpc>
               <a:buFont typeface="Arial" panose="020B0604020202020204" pitchFamily="34" charset="0"/>
               <a:buNone/>
             </a:pPr>
             <a:r>
-              <a:rPr lang="ru-RU" sz="1500" dirty="0">
+              <a:rPr lang="ru-RU" sz="1800" dirty="0">
                 <a:solidFill>
                   <a:schemeClr val="bg1">
                     <a:lumMod val="50000"/>
@@ -6526,10 +6572,13 @@
               <a:buFont typeface="Arial" panose="020B0604020202020204" pitchFamily="34" charset="0"/>
               <a:buNone/>
             </a:pPr>
-            <a:r>
-              <a:rPr lang="ru-RU" sz="1500" dirty="0"/>
-              <a:t>сбыт престижных товаров растет вслед за увеличением цен</a:t>
-            </a:r>
+            <a:endParaRPr lang="ru-RU" sz="1500" dirty="0">
+              <a:solidFill>
+                <a:schemeClr val="bg1">
+                  <a:lumMod val="50000"/>
+                </a:schemeClr>
+              </a:solidFill>
+            </a:endParaRPr>
           </a:p>
         </p:txBody>
       </p:sp>
@@ -6547,8 +6596,8 @@
         </p:nvSpPr>
         <p:spPr>
           <a:xfrm>
-            <a:off x="838200" y="3846705"/>
-            <a:ext cx="4765964" cy="2200026"/>
+            <a:off x="838200" y="3949967"/>
+            <a:ext cx="4765964" cy="1161280"/>
           </a:xfrm>
           <a:prstGeom prst="rect">
             <a:avLst/>
@@ -6561,7 +6610,7 @@
           </a:bodyPr>
           <a:lstStyle/>
           <a:p>
-            <a:pPr marL="0" indent="0">
+            <a:pPr marL="0" indent="0" algn="ctr">
               <a:lnSpc>
                 <a:spcPct val="150000"/>
               </a:lnSpc>
@@ -6593,7 +6642,7 @@
             </a:endParaRPr>
           </a:p>
           <a:p>
-            <a:pPr marL="0" indent="0">
+            <a:pPr marL="0" indent="0" algn="ctr">
               <a:lnSpc>
                 <a:spcPct val="150000"/>
               </a:lnSpc>
@@ -6603,31 +6652,7 @@
               <a:rPr lang="ru-RU" sz="1500" dirty="0">
                 <a:latin typeface="Montserrat" panose="00000500000000000000" pitchFamily="2" charset="0"/>
               </a:rPr>
-              <a:t>Люди будут покупать их, даже если стоимость сильно изменится. К товарам неэластичного спроса относят, кроме того, предметы, которые характеризуют </a:t>
-            </a:r>
-            <a:r>
-              <a:rPr lang="ru-RU" sz="1500" b="1" dirty="0">
-                <a:latin typeface="Montserrat" panose="00000500000000000000" pitchFamily="2" charset="0"/>
-              </a:rPr>
-              <a:t>привычки </a:t>
-            </a:r>
-            <a:r>
-              <a:rPr lang="ru-RU" sz="1500" dirty="0">
-                <a:latin typeface="Montserrat" panose="00000500000000000000" pitchFamily="2" charset="0"/>
-              </a:rPr>
-              <a:t>и </a:t>
-            </a:r>
-            <a:r>
-              <a:rPr lang="ru-RU" sz="1500" b="1" dirty="0">
-                <a:latin typeface="Montserrat" panose="00000500000000000000" pitchFamily="2" charset="0"/>
-              </a:rPr>
-              <a:t>образ жизни </a:t>
-            </a:r>
-            <a:r>
-              <a:rPr lang="ru-RU" sz="1500" dirty="0">
-                <a:latin typeface="Montserrat" panose="00000500000000000000" pitchFamily="2" charset="0"/>
-              </a:rPr>
-              <a:t>людей.</a:t>
+              <a:t>люди будут покупать их, даже если стоимость сильно изменится</a:t>
             </a:r>
           </a:p>
         </p:txBody>
@@ -6646,8 +6671,8 @@
         </p:nvSpPr>
         <p:spPr>
           <a:xfrm>
-            <a:off x="6096000" y="3842858"/>
-            <a:ext cx="4097246" cy="464871"/>
+            <a:off x="6104776" y="3949967"/>
+            <a:ext cx="4888805" cy="1161280"/>
           </a:xfrm>
           <a:prstGeom prst="rect">
             <a:avLst/>
@@ -6660,7 +6685,7 @@
           </a:bodyPr>
           <a:lstStyle/>
           <a:p>
-            <a:pPr marL="0" indent="0">
+            <a:pPr marL="0" indent="0" algn="ctr">
               <a:lnSpc>
                 <a:spcPct val="150000"/>
               </a:lnSpc>
@@ -6691,6 +6716,21 @@
               </a:solidFill>
               <a:latin typeface="Montserrat" panose="00000500000000000000" pitchFamily="2" charset="0"/>
             </a:endParaRPr>
+          </a:p>
+          <a:p>
+            <a:pPr marL="0" indent="0" algn="ctr">
+              <a:lnSpc>
+                <a:spcPct val="150000"/>
+              </a:lnSpc>
+              <a:buFont typeface="Arial" panose="020B0604020202020204" pitchFamily="34" charset="0"/>
+              <a:buNone/>
+            </a:pPr>
+            <a:r>
+              <a:rPr lang="ru-RU" sz="1500" dirty="0">
+                <a:latin typeface="Montserrat" panose="00000500000000000000" pitchFamily="2" charset="0"/>
+              </a:rPr>
+              <a:t>сбыт престижных товаров растет вслед за увеличением цен</a:t>
+            </a:r>
           </a:p>
         </p:txBody>
       </p:sp>
@@ -6984,8 +7024,8 @@
           </a:prstGeom>
         </p:spPr>
       </p:pic>
-      <mc:AlternateContent xmlns:mc="http://schemas.openxmlformats.org/markup-compatibility/2006">
-        <mc:Choice xmlns:a14="http://schemas.microsoft.com/office/drawing/2010/main" Requires="a14">
+      <mc:AlternateContent xmlns:mc="http://schemas.openxmlformats.org/markup-compatibility/2006" xmlns:a14="http://schemas.microsoft.com/office/drawing/2010/main">
+        <mc:Choice Requires="a14">
           <p:sp>
             <p:nvSpPr>
               <p:cNvPr id="10" name="TextBox 9">
@@ -7554,7 +7594,7 @@
             </p:txBody>
           </p:sp>
         </mc:Choice>
-        <mc:Fallback>
+        <mc:Fallback xmlns="">
           <p:sp>
             <p:nvSpPr>
               <p:cNvPr id="10" name="TextBox 9">
@@ -7580,7 +7620,7 @@
               <a:blipFill>
                 <a:blip r:embed="rId5"/>
                 <a:stretch>
-                  <a:fillRect l="-412" b="-1684"/>
+                  <a:fillRect l="-515" b="-7424"/>
                 </a:stretch>
               </a:blipFill>
             </p:spPr>
@@ -7589,7 +7629,7 @@
               <a:lstStyle/>
               <a:p>
                 <a:r>
-                  <a:rPr lang="ru-RU">
+                  <a:rPr lang="en-RU">
                     <a:noFill/>
                   </a:rPr>
                   <a:t> </a:t>
@@ -7781,62 +7821,51 @@
                   <a:buNone/>
                 </a:pPr>
                 <a:r>
-                  <a:rPr lang="ru-RU" sz="1500" dirty="0"/>
+                  <a:rPr lang="ru-RU" sz="1800" dirty="0"/>
                   <a:t>п</a:t>
                 </a:r>
                 <a:r>
-                  <a:rPr lang="ru-RU" sz="1500" dirty="0">
+                  <a:rPr lang="ru-RU" sz="1800" dirty="0">
                     <a:latin typeface="Montserrat" panose="00000500000000000000" pitchFamily="2" charset="0"/>
                   </a:rPr>
                   <a:t>оказывает, как изменится </a:t>
                 </a:r>
                 <a:r>
-                  <a:rPr lang="ru-RU" sz="1500" b="1" dirty="0">
+                  <a:rPr lang="ru-RU" sz="1800" b="1" dirty="0">
                     <a:latin typeface="Montserrat" panose="00000500000000000000" pitchFamily="2" charset="0"/>
                   </a:rPr>
                   <a:t>спрос</a:t>
                 </a:r>
                 <a:r>
-                  <a:rPr lang="ru-RU" sz="1500" dirty="0">
+                  <a:rPr lang="ru-RU" sz="1800" dirty="0">
                     <a:latin typeface="Montserrat" panose="00000500000000000000" pitchFamily="2" charset="0"/>
                   </a:rPr>
                   <a:t> на один товар, если </a:t>
                 </a:r>
                 <a:r>
-                  <a:rPr lang="ru-RU" sz="1500" b="1" dirty="0">
+                  <a:rPr lang="ru-RU" sz="1800" b="1" dirty="0">
                     <a:latin typeface="Montserrat" panose="00000500000000000000" pitchFamily="2" charset="0"/>
                   </a:rPr>
                   <a:t>поднять</a:t>
                 </a:r>
                 <a:r>
-                  <a:rPr lang="ru-RU" sz="1500" dirty="0">
+                  <a:rPr lang="ru-RU" sz="1800" dirty="0">
                     <a:latin typeface="Montserrat" panose="00000500000000000000" pitchFamily="2" charset="0"/>
                   </a:rPr>
                   <a:t> или </a:t>
                 </a:r>
                 <a:r>
-                  <a:rPr lang="ru-RU" sz="1500" b="1" dirty="0">
+                  <a:rPr lang="ru-RU" sz="1800" b="1" dirty="0">
                     <a:latin typeface="Montserrat" panose="00000500000000000000" pitchFamily="2" charset="0"/>
                   </a:rPr>
                   <a:t>понизить</a:t>
                 </a:r>
                 <a:r>
-                  <a:rPr lang="ru-RU" sz="1500" dirty="0">
+                  <a:rPr lang="ru-RU" sz="1800" dirty="0">
                     <a:latin typeface="Montserrat" panose="00000500000000000000" pitchFamily="2" charset="0"/>
                   </a:rPr>
                   <a:t> цену другого товара</a:t>
                 </a:r>
-                <a:endParaRPr lang="en-US" sz="1500" dirty="0">
-                  <a:latin typeface="Montserrat" panose="00000500000000000000" pitchFamily="2" charset="0"/>
-                </a:endParaRPr>
-              </a:p>
-              <a:p>
-                <a:pPr marL="0" indent="0">
-                  <a:lnSpc>
-                    <a:spcPct val="150000"/>
-                  </a:lnSpc>
-                  <a:buNone/>
-                </a:pPr>
                 <a:endParaRPr lang="en-US" sz="1800" dirty="0">
                   <a:latin typeface="Montserrat" panose="00000500000000000000" pitchFamily="2" charset="0"/>
                 </a:endParaRPr>
@@ -8085,52 +8114,58 @@
                 </a:pPr>
                 <a:r>
                   <a:rPr lang="ru-RU" sz="1500" dirty="0"/>
-                  <a:t>Взаимозаменяемое благо </a:t>
+                  <a:t>взаимозаменяемое благо </a:t>
                 </a:r>
                 <a14:m>
                   <m:oMath xmlns:m="http://schemas.openxmlformats.org/officeDocument/2006/math">
                     <m:sSubSup>
                       <m:sSubSupPr>
                         <m:ctrlPr>
-                          <a:rPr lang="en-US" sz="1500" i="1" smtClean="0">
+                          <a:rPr lang="en-US" sz="1500" b="1" i="1" smtClean="0">
                             <a:latin typeface="Cambria Math" panose="02040503050406030204" pitchFamily="18" charset="0"/>
                           </a:rPr>
                         </m:ctrlPr>
                       </m:sSubSupPr>
                       <m:e>
                         <m:r>
-                          <a:rPr lang="en-US" sz="1500" b="0" i="1" smtClean="0">
+                          <a:rPr lang="en-US" sz="1500" b="1" i="1" smtClean="0">
                             <a:latin typeface="Cambria Math" panose="02040503050406030204" pitchFamily="18" charset="0"/>
                           </a:rPr>
-                          <m:t>𝐸</m:t>
+                          <m:t>𝑬</m:t>
                         </m:r>
                       </m:e>
                       <m:sub>
                         <m:r>
-                          <a:rPr lang="en-US" sz="1500" b="0" i="1" smtClean="0">
+                          <a:rPr lang="en-US" sz="1500" b="1" i="1" smtClean="0">
                             <a:latin typeface="Cambria Math" panose="02040503050406030204" pitchFamily="18" charset="0"/>
                           </a:rPr>
-                          <m:t>𝑋𝑌</m:t>
+                          <m:t>𝑿𝒀</m:t>
                         </m:r>
                       </m:sub>
                       <m:sup>
                         <m:r>
-                          <a:rPr lang="en-US" sz="1500" b="0" i="1" smtClean="0">
+                          <a:rPr lang="en-US" sz="1500" b="1" i="1" smtClean="0">
                             <a:latin typeface="Cambria Math" panose="02040503050406030204" pitchFamily="18" charset="0"/>
                           </a:rPr>
-                          <m:t>𝐷</m:t>
+                          <m:t>𝑫</m:t>
                         </m:r>
                       </m:sup>
                     </m:sSubSup>
                     <m:r>
-                      <a:rPr lang="en-US" sz="1500" b="0" i="1" smtClean="0">
+                      <a:rPr lang="en-US" sz="1500" b="1" i="1" smtClean="0">
                         <a:latin typeface="Cambria Math" panose="02040503050406030204" pitchFamily="18" charset="0"/>
                       </a:rPr>
-                      <m:t>&gt;0</m:t>
+                      <m:t>&gt;</m:t>
+                    </m:r>
+                    <m:r>
+                      <a:rPr lang="en-US" sz="1500" b="1" i="1" smtClean="0">
+                        <a:latin typeface="Cambria Math" panose="02040503050406030204" pitchFamily="18" charset="0"/>
+                      </a:rPr>
+                      <m:t>𝟎</m:t>
                     </m:r>
                   </m:oMath>
                 </a14:m>
-                <a:endParaRPr lang="ru-RU" sz="1500" dirty="0"/>
+                <a:endParaRPr lang="ru-RU" sz="1500" b="1" dirty="0"/>
               </a:p>
               <a:p>
                 <a:pPr marL="342900" indent="-342900">
@@ -8142,52 +8177,58 @@
                 </a:pPr>
                 <a:r>
                   <a:rPr lang="ru-RU" sz="1500" dirty="0"/>
-                  <a:t>Комплементарные благ </a:t>
+                  <a:t>комплементарные благ </a:t>
                 </a:r>
                 <a14:m>
                   <m:oMath xmlns:m="http://schemas.openxmlformats.org/officeDocument/2006/math">
                     <m:sSubSup>
                       <m:sSubSupPr>
                         <m:ctrlPr>
-                          <a:rPr lang="en-US" sz="1500" i="1" smtClean="0">
+                          <a:rPr lang="en-US" sz="1500" b="1" i="1" smtClean="0">
                             <a:latin typeface="Cambria Math" panose="02040503050406030204" pitchFamily="18" charset="0"/>
                           </a:rPr>
                         </m:ctrlPr>
                       </m:sSubSupPr>
                       <m:e>
                         <m:r>
-                          <a:rPr lang="en-US" sz="1500" b="0" i="1" smtClean="0">
+                          <a:rPr lang="en-US" sz="1500" b="1" i="1" smtClean="0">
                             <a:latin typeface="Cambria Math" panose="02040503050406030204" pitchFamily="18" charset="0"/>
                           </a:rPr>
-                          <m:t>𝐸</m:t>
+                          <m:t>𝑬</m:t>
                         </m:r>
                       </m:e>
                       <m:sub>
                         <m:r>
-                          <a:rPr lang="en-US" sz="1500" b="0" i="1" smtClean="0">
+                          <a:rPr lang="en-US" sz="1500" b="1" i="1" smtClean="0">
                             <a:latin typeface="Cambria Math" panose="02040503050406030204" pitchFamily="18" charset="0"/>
                           </a:rPr>
-                          <m:t>𝑋𝑌</m:t>
+                          <m:t>𝑿𝒀</m:t>
                         </m:r>
                       </m:sub>
                       <m:sup>
                         <m:r>
-                          <a:rPr lang="en-US" sz="1500" b="0" i="1" smtClean="0">
+                          <a:rPr lang="en-US" sz="1500" b="1" i="1" smtClean="0">
                             <a:latin typeface="Cambria Math" panose="02040503050406030204" pitchFamily="18" charset="0"/>
                           </a:rPr>
-                          <m:t>𝐷</m:t>
+                          <m:t>𝑫</m:t>
                         </m:r>
                       </m:sup>
                     </m:sSubSup>
                     <m:r>
-                      <a:rPr lang="en-US" sz="1500" b="0" i="1" smtClean="0">
+                      <a:rPr lang="en-US" sz="1500" b="1" i="1" smtClean="0">
                         <a:latin typeface="Cambria Math" panose="02040503050406030204" pitchFamily="18" charset="0"/>
                       </a:rPr>
-                      <m:t>&lt;0</m:t>
+                      <m:t>&lt;</m:t>
+                    </m:r>
+                    <m:r>
+                      <a:rPr lang="en-US" sz="1500" b="1" i="1" smtClean="0">
+                        <a:latin typeface="Cambria Math" panose="02040503050406030204" pitchFamily="18" charset="0"/>
+                      </a:rPr>
+                      <m:t>𝟎</m:t>
                     </m:r>
                   </m:oMath>
                 </a14:m>
-                <a:endParaRPr lang="ru-RU" sz="1500" dirty="0"/>
+                <a:endParaRPr lang="ru-RU" sz="1500" b="1" dirty="0"/>
               </a:p>
               <a:p>
                 <a:pPr marL="342900" indent="-342900">
@@ -8199,52 +8240,58 @@
                 </a:pPr>
                 <a:r>
                   <a:rPr lang="ru-RU" sz="1500" dirty="0"/>
-                  <a:t>Независимые друг от друга блага </a:t>
+                  <a:t>независимые друг от друга блага </a:t>
                 </a:r>
                 <a14:m>
                   <m:oMath xmlns:m="http://schemas.openxmlformats.org/officeDocument/2006/math">
                     <m:sSubSup>
                       <m:sSubSupPr>
                         <m:ctrlPr>
-                          <a:rPr lang="en-US" sz="1500" i="1" smtClean="0">
+                          <a:rPr lang="en-US" sz="1500" b="1" i="1" smtClean="0">
                             <a:latin typeface="Cambria Math" panose="02040503050406030204" pitchFamily="18" charset="0"/>
                           </a:rPr>
                         </m:ctrlPr>
                       </m:sSubSupPr>
                       <m:e>
                         <m:r>
-                          <a:rPr lang="en-US" sz="1500" b="0" i="1" smtClean="0">
+                          <a:rPr lang="en-US" sz="1500" b="1" i="1" smtClean="0">
                             <a:latin typeface="Cambria Math" panose="02040503050406030204" pitchFamily="18" charset="0"/>
                           </a:rPr>
-                          <m:t>𝐸</m:t>
+                          <m:t>𝑬</m:t>
                         </m:r>
                       </m:e>
                       <m:sub>
                         <m:r>
-                          <a:rPr lang="en-US" sz="1500" b="0" i="1" smtClean="0">
+                          <a:rPr lang="en-US" sz="1500" b="1" i="1" smtClean="0">
                             <a:latin typeface="Cambria Math" panose="02040503050406030204" pitchFamily="18" charset="0"/>
                           </a:rPr>
-                          <m:t>𝑋𝑌</m:t>
+                          <m:t>𝑿𝒀</m:t>
                         </m:r>
                       </m:sub>
                       <m:sup>
                         <m:r>
-                          <a:rPr lang="en-US" sz="1500" b="0" i="1" smtClean="0">
+                          <a:rPr lang="en-US" sz="1500" b="1" i="1" smtClean="0">
                             <a:latin typeface="Cambria Math" panose="02040503050406030204" pitchFamily="18" charset="0"/>
                           </a:rPr>
-                          <m:t>𝐷</m:t>
+                          <m:t>𝑫</m:t>
                         </m:r>
                       </m:sup>
                     </m:sSubSup>
                     <m:r>
-                      <a:rPr lang="en-US" sz="1500" b="0" i="1" smtClean="0">
+                      <a:rPr lang="en-US" sz="1500" b="1" i="1" smtClean="0">
                         <a:latin typeface="Cambria Math" panose="02040503050406030204" pitchFamily="18" charset="0"/>
                       </a:rPr>
-                      <m:t>=0</m:t>
+                      <m:t>=</m:t>
+                    </m:r>
+                    <m:r>
+                      <a:rPr lang="en-US" sz="1500" b="1" i="1" smtClean="0">
+                        <a:latin typeface="Cambria Math" panose="02040503050406030204" pitchFamily="18" charset="0"/>
+                      </a:rPr>
+                      <m:t>𝟎</m:t>
                     </m:r>
                   </m:oMath>
                 </a14:m>
-                <a:endParaRPr lang="ru-RU" sz="1500" dirty="0"/>
+                <a:endParaRPr lang="ru-RU" sz="1500" b="1" dirty="0"/>
               </a:p>
               <a:p>
                 <a:pPr marL="0" indent="0">
@@ -8279,7 +8326,7 @@
               <a:blipFill>
                 <a:blip r:embed="rId3"/>
                 <a:stretch>
-                  <a:fillRect l="-290"/>
+                  <a:fillRect l="-522"/>
                 </a:stretch>
               </a:blipFill>
             </p:spPr>
@@ -8458,8 +8505,8 @@
           </a:p>
         </p:txBody>
       </p:sp>
-      <mc:AlternateContent xmlns:mc="http://schemas.openxmlformats.org/markup-compatibility/2006">
-        <mc:Choice xmlns:a14="http://schemas.microsoft.com/office/drawing/2010/main" Requires="a14">
+      <mc:AlternateContent xmlns:mc="http://schemas.openxmlformats.org/markup-compatibility/2006" xmlns:a14="http://schemas.microsoft.com/office/drawing/2010/main">
+        <mc:Choice Requires="a14">
           <p:sp>
             <p:nvSpPr>
               <p:cNvPr id="3" name="Объект 2"/>
@@ -8484,13 +8531,13 @@
                   <a:buNone/>
                 </a:pPr>
                 <a:r>
-                  <a:rPr lang="ru-RU" sz="1500" dirty="0">
+                  <a:rPr lang="ru-RU" sz="1800" dirty="0">
                     <a:latin typeface="Montserrat" panose="00000500000000000000" pitchFamily="2" charset="0"/>
                   </a:rPr>
                   <a:t>демонстрирует, как </a:t>
                 </a:r>
                 <a:r>
-                  <a:rPr lang="ru-RU" sz="1500" dirty="0">
+                  <a:rPr lang="ru-RU" sz="1800" dirty="0">
                     <a:solidFill>
                       <a:srgbClr val="326CDB"/>
                     </a:solidFill>
@@ -8499,12 +8546,12 @@
                   <a:t>продавцы</a:t>
                 </a:r>
                 <a:r>
-                  <a:rPr lang="ru-RU" sz="1500" dirty="0">
+                  <a:rPr lang="ru-RU" sz="1800" dirty="0">
                     <a:latin typeface="Montserrat" panose="00000500000000000000" pitchFamily="2" charset="0"/>
                   </a:rPr>
                   <a:t> реагируют на изменение цены: увеличивают или уменьшают объемы продукции на рынке</a:t>
                 </a:r>
-                <a:endParaRPr lang="en-US" sz="1500" dirty="0">
+                <a:endParaRPr lang="en-US" sz="1800" dirty="0">
                   <a:latin typeface="Montserrat" panose="00000500000000000000" pitchFamily="2" charset="0"/>
                 </a:endParaRPr>
               </a:p>
@@ -8774,7 +8821,7 @@
             </p:txBody>
           </p:sp>
         </mc:Choice>
-        <mc:Fallback>
+        <mc:Fallback xmlns="">
           <p:sp>
             <p:nvSpPr>
               <p:cNvPr id="3" name="Объект 2"/>
@@ -8789,7 +8836,7 @@
               <a:blipFill>
                 <a:blip r:embed="rId3"/>
                 <a:stretch>
-                  <a:fillRect l="-232"/>
+                  <a:fillRect l="-522"/>
                 </a:stretch>
               </a:blipFill>
             </p:spPr>
@@ -9027,7 +9074,7 @@
               <a:rPr lang="ru-RU" sz="1500" dirty="0">
                 <a:latin typeface="Montserrat" panose="00000500000000000000" pitchFamily="2" charset="0"/>
               </a:rPr>
-              <a:t>— существует только одна цена, по которой товар будет предлагаться на рынке. </a:t>
+              <a:t>— существует только одна цена, по которой товар будет предлагаться на рынке.</a:t>
             </a:r>
           </a:p>
           <a:p>
@@ -9049,7 +9096,7 @@
               <a:rPr lang="ru-RU" sz="1500" dirty="0">
                 <a:latin typeface="Montserrat" panose="00000500000000000000" pitchFamily="2" charset="0"/>
               </a:rPr>
-              <a:t>— при изменении цены предложение существенно изменяется. </a:t>
+              <a:t>— при изменении цены предложение существенно изменяется </a:t>
             </a:r>
           </a:p>
           <a:p>
@@ -9093,7 +9140,7 @@
               <a:rPr lang="ru-RU" sz="1500" dirty="0">
                 <a:latin typeface="Montserrat" panose="00000500000000000000" pitchFamily="2" charset="0"/>
               </a:rPr>
-              <a:t>— как бы ни менялась цена, предложение будет постоянно на одном уровне. </a:t>
+              <a:t>— как бы ни менялась цена, предложение будет постоянно на одном уровне</a:t>
             </a:r>
           </a:p>
         </p:txBody>
@@ -11428,7 +11475,7 @@
               <a:rPr lang="ru-RU" sz="1800" dirty="0">
                 <a:latin typeface="Montserrat" panose="00000500000000000000" pitchFamily="2" charset="0"/>
               </a:rPr>
-              <a:t>— точка, в которой объём спроса на товар равен объёму его предложения.</a:t>
+              <a:t>— точка, в которой объём спроса на товар равен объёму его предложения</a:t>
             </a:r>
           </a:p>
           <a:p>
@@ -11748,7 +11795,7 @@
               <a:rPr lang="ru-RU" sz="1800" dirty="0">
                 <a:latin typeface="Montserrat" panose="00000500000000000000" pitchFamily="2" charset="0"/>
               </a:rPr>
-              <a:t>эластичностью спроса и предложения понимают то, как эти показатели реагируют на изменение цены.</a:t>
+              <a:t>эластичностью спроса и предложения понимают то, как эти показатели реагируют на изменение цены</a:t>
             </a:r>
           </a:p>
           <a:p>
@@ -12039,8 +12086,8 @@
           </a:p>
         </p:txBody>
       </p:sp>
-      <mc:AlternateContent xmlns:mc="http://schemas.openxmlformats.org/markup-compatibility/2006">
-        <mc:Choice xmlns:a14="http://schemas.microsoft.com/office/drawing/2010/main" Requires="a14">
+      <mc:AlternateContent xmlns:mc="http://schemas.openxmlformats.org/markup-compatibility/2006" xmlns:a14="http://schemas.microsoft.com/office/drawing/2010/main">
+        <mc:Choice Requires="a14">
           <p:sp>
             <p:nvSpPr>
               <p:cNvPr id="3" name="Объект 2"/>
@@ -12054,7 +12101,7 @@
             <p:spPr/>
             <p:txBody>
               <a:bodyPr anchor="t">
-                <a:normAutofit lnSpcReduction="10000"/>
+                <a:normAutofit/>
               </a:bodyPr>
               <a:lstStyle/>
               <a:p>
@@ -12343,7 +12390,7 @@
             </p:txBody>
           </p:sp>
         </mc:Choice>
-        <mc:Fallback>
+        <mc:Fallback xmlns="">
           <p:sp>
             <p:nvSpPr>
               <p:cNvPr id="3" name="Объект 2"/>
@@ -12358,7 +12405,7 @@
               <a:blipFill>
                 <a:blip r:embed="rId3"/>
                 <a:stretch>
-                  <a:fillRect l="-522"/>
+                  <a:fillRect l="-603"/>
                 </a:stretch>
               </a:blipFill>
             </p:spPr>
@@ -12367,7 +12414,7 @@
               <a:lstStyle/>
               <a:p>
                 <a:r>
-                  <a:rPr lang="ru-RU">
+                  <a:rPr lang="en-RU">
                     <a:noFill/>
                   </a:rPr>
                   <a:t> </a:t>
@@ -12568,13 +12615,13 @@
         </p:nvSpPr>
         <p:spPr>
           <a:xfrm>
-            <a:off x="838200" y="2187574"/>
+            <a:off x="838200" y="1936457"/>
             <a:ext cx="6229350" cy="3575917"/>
           </a:xfrm>
         </p:spPr>
         <p:txBody>
           <a:bodyPr>
-            <a:normAutofit fontScale="92500" lnSpcReduction="10000"/>
+            <a:noAutofit/>
           </a:bodyPr>
           <a:lstStyle/>
           <a:p>
@@ -12833,7 +12880,7 @@
         </p:blipFill>
         <p:spPr>
           <a:xfrm>
-            <a:off x="7067550" y="2187574"/>
+            <a:off x="7067550" y="1936457"/>
             <a:ext cx="4286250" cy="3429000"/>
           </a:xfrm>
           <a:prstGeom prst="rect">

</xml_diff>